<commit_message>
Add icon and change current tab name in the navigator.
</commit_message>
<xml_diff>
--- a/img/logo_barnadavy.pptx
+++ b/img/logo_barnadavy.pptx
@@ -6,6 +6,7 @@
   </p:sldMasterIdLst>
   <p:sldIdLst>
     <p:sldId id="256" r:id="rId2"/>
+    <p:sldId id="257" r:id="rId3"/>
   </p:sldIdLst>
   <p:sldSz cx="12192000" cy="6858000"/>
   <p:notesSz cx="6858000" cy="9144000"/>
@@ -112,6 +113,57 @@
 </p:presentation>
 </file>
 
+<file path=ppt/ink/ink1.xml><?xml version="1.0" encoding="utf-8"?>
+<inkml:ink xmlns:inkml="http://www.w3.org/2003/InkML">
+  <inkml:definitions>
+    <inkml:context xml:id="ctx0">
+      <inkml:inkSource xml:id="inkSrc0">
+        <inkml:traceFormat>
+          <inkml:channel name="X" type="integer" min="-2.14748E9" max="2.14748E9" units="cm"/>
+          <inkml:channel name="Y" type="integer" min="-2.14748E9" max="2.14748E9" units="cm"/>
+          <inkml:channel name="F" type="integer" max="32767" units="dev"/>
+        </inkml:traceFormat>
+        <inkml:channelProperties>
+          <inkml:channelProperty channel="X" name="resolution" value="1000" units="1/cm"/>
+          <inkml:channelProperty channel="Y" name="resolution" value="1000" units="1/cm"/>
+          <inkml:channelProperty channel="F" name="resolution" value="0" units="1/dev"/>
+        </inkml:channelProperties>
+      </inkml:inkSource>
+      <inkml:timestamp xml:id="ts0" timeString="2018-11-21T11:55:15.262"/>
+    </inkml:context>
+    <inkml:brush xml:id="br0">
+      <inkml:brushProperty name="width" value="0.35" units="cm"/>
+      <inkml:brushProperty name="height" value="0.35" units="cm"/>
+      <inkml:brushProperty name="color" value="#FFFFFF"/>
+    </inkml:brush>
+    <inkml:brush xml:id="br1">
+      <inkml:brushProperty name="width" value="0.35" units="cm"/>
+      <inkml:brushProperty name="height" value="0.35" units="cm"/>
+      <inkml:brushProperty name="color" value="#474949"/>
+    </inkml:brush>
+    <inkml:brush xml:id="br2">
+      <inkml:brushProperty name="width" value="0.35" units="cm"/>
+      <inkml:brushProperty name="height" value="0.35" units="cm"/>
+      <inkml:brushProperty name="color" value="#65D1F9"/>
+    </inkml:brush>
+  </inkml:definitions>
+  <inkml:trace contextRef="#ctx0" brushRef="#br0">2917 536 24575,'-5'50'0,"1"-17"0,4 2 0,0-15 0,0-2 0,0 8 0,0-4 0,0 0 0,0 3 0,0-3 0,0 5 0,4-5 0,0-1 0,4-9 0,0 0 0,-1-8 0,5-1 0,0-3 0,9 0 0,1-4 0,2-20 0,6-16 0,-7-29 0,7-17 0,-17 14-343,-3 19 0,-2-1 343,-1-29 0,-3 30 0,-1 2 0,3-28 0,-15 12 0,-14 12 0,-10 11 0,-15 6 0,-7 17 0,0 10 686,-4 6-686,6 10 0,-3 28 0,4 12 0,4 33-514,5 10 514,17-16 0,6-13 0,3-1 0,7 5 0,0-10 0,1 2 0,9 15-59,0 7 59,0-1 0,0-21 0,0-9 0,0-14 0,0-14 513,3-2-513,1-8 60,7-4-60,2-4 0,5-25 0,-4-2 0,1-24 0,0 4 0,-3-5 0,3-8 0,-5 12 0,-4-10 0,-1 17 0,-5 2 0,0 6 0,0 11 0,0 5 0,0 6 0,0 3 0,0 61 0,0-5 0,0 2 0,0 4 0,0 39 0,0-6 0,0-14 0,5-1 0,5-24 0,2 6 0,6-15 0,-4-15 0,8-7 0,5-12 0,13-16 0,12-32 0,-11-6 0,0-8 0,-5 5 0,0-5 0,14-28 0,-2 1 0,-19 34 0,-3 1 0,2-13 0,-4 3 0,3 2 0,-10-2 0,-3 25 0,-6 10 0,-3 8 0,-13 81 0,-10-20 0,1 22 0,-1 7-492,-1-24 0,0 1 314,0 20 1,1 1 177,4-21 0,1-1-182,0 10 0,1-2 182,-2 21 0,2 7 0,6-18 0,6-20 0,0-18 0,0-14 0,3-12 983,13-31-653,16-36-330,5-18-376,-13 17 0,0-1 376,13-27 0,-11 12 0,0 0 0,7-2 0,-12 16 0,-1 2 0,2 1 0,-4 0 0,1 17 0,-9 18 0,2 11 0,-8 12 983,0 41-824,-4 62-159,0-29 0,0 7-328,0-6 0,0 6 0,0-4-164,0 12 0,0 0 303,0-12 1,0 4 0,0-3 188,0 16 0,0-1 0,-1-18 0,1 1 0,1-4 0,1 9 0,1-2-303,0 7 1,1-5 302,8 8 0,-3-31 0,0-1 0,8 10 0,-1-16 0,1-18 0,-8-11 0,2-6 983,-4-7 0,5 0 0,-3-28-794,10-12-189,-1-33 0,6-16-492,-11 34 0,0-2 432,-3-4 1,0-1 59,4-9 0,-1 1 0,-6 15 0,0 1-214,3-10 1,0 1 213,2-20 0,-5-7 0,3 6 0,-9 33 0,4 0 0,-5 60 0,-17 28 0,2 10 0,-2 8-492,-8 13 0,-3 6 345,7-15 0,-1 2 1,1 1 146,-2 7 0,0 2 0,1-2 0,-3 17 0,0 0 0,6-17 0,-1 2 0,2-2 0,-3 17 0,1-3 0,3-7 0,1 0-477,-1 13 0,3-4 477,7-37 0,1-2-104,-1 13 0,1-2 104,-2 18 0,3-18 0,5-26 983,0-19 0,16-86-612,8-16-625,-2 10 0,2-4 254,-1 2 0,0 0 0,7-6 0,0-1 0,-6 0 0,0-1-328,-4 23 0,2-1 0,-2 0-164,5-27 0,-1 0 427,0 0 0,-1 0 65,-2 0 0,-3 2-492,-3 9 0,0 2 226,0 0 0,-1 1 266,-2 3 0,-1 2 0,0 3 0,-1 3-157,-4 14 0,0 2 157,1-48 0,3 27 0,-8-6 983,3 8-374,-1 15 374,-2 15 0,2 11 0,-4 7 0,0 9-292,0 0-691,0 67 0,0-5 0,-2 4 0,-2 6-492,-2-8 0,-2 0 469,-2 9 1,-1 3-470,-4 7 0,1 3 125,-1 5 1,0 0 366,-1 5 0,1 1 0,3 0 0,0-2 0,1-21 0,2 0 0,0 30 0,2-4 0,0-10-371,3-8 1,1 1 370,3 8-176,0 0 176,0 5 0,0-16 0,0 15 0,0-11 0,0 12 889,0-23-889,0 5 983,0-12-251,-5 6 115,-1-14-847,-3-6 212,3-13-212,-2-6 0,4-8 0,-4-5 0,1-5 0,-9-3 0,1-17 0,-14-18 0,-5-22 0,-8-14 0,-14-10-410,27 40 0,0 0 410,-2-2 0,-1 3 0,-15-16 0,-3-4 0,14 32 0,-6-10 0,7 14 0,3 14 0,5 2 820,4 8-820,2 0 0,5 3 0,-1 10 0,3 11 0,5 9 0,5 6 0,4 0 0,0-5 0,0-2 0,0-10 0,4-1 0,8-8 0,12-5 0,22-8 0,-3-15 0,11-19 0,-12-5 0,-13-8 0,5 1 0,-3-18 0,-7 13 0,5-17 0,-19 15 0,1-8 0,1-23 0,-5 25 0,-2-15 0,-5 27 0,0 1 0,0 1 0,0 11 0,-3 6 0,-6 11 0,-8 9 0,-1 4 0,-26 17 0,15 9 0,-25 21 0,20 12 0,-5 8 0,11-8 0,0 25 0,11-21 0,4 33 0,8-23 0,5 0 0,0-16 0,0-8 0,9-6 0,10-9 0,6-2 0,7-14 0,7 0 0,-4-9 0,10 0 0,-6-14 0,9-20 0,-2-19 0,7-19-758,-8-20 758,-2-2 0,-17 16 0,-2-4 0,-5 15 0,-2 0 0,4-14 0,-4 1 0,-9 17 0,-3 3 0,-1-1 0,-2 0 0,-2-42 0,-4 43 0,-3 0 0,-19-34 0,8 40 0,-5 1 0,-7 5 0,-3 1 0,0-1 0,0 3 0,-22-11 0,-15-7 0,25 24 0,-11-1 0,9 4 0,13 16 0,7-2 758,6 11-758,8-1 0,2 4 0,3 2 0,1-16 0,2 10 0,-2-20 0,2 14 0,-4-8 0,1 4 0,0 1 0,0 0 0,0 3 0,0-2 0,3 6 0,-2 1 0,3-2 0,0 5 0,-3-6 0,3 1 0,-3 5 0,-1-5 0,1 6 0,-1-1 0,-6 2 0,0 3 0,-10 0 0,7 0 0,-9 0 0,8 4 0,-7 1 0,7 3 0,-3 0 0,5 0 0,3 0 0,2 0 0,3-1 0,4 1 0,-6-1 0,5 0 0,-6 5 0,3 0 0,-4 9 0,3-8 0,-4 7 0,9-7 0,-3 3 0,2-4 0,1 0 0,1-5 0,3 0 0</inkml:trace>
+  <inkml:trace contextRef="#ctx0" brushRef="#br0" timeOffset="7120">2373 970 24575,'-4'37'0,"-2"14"0,-3-19 0,-8 30 0,6-17 0,-5 16 0,1-8 0,8-2 0,-10-10 0,10 10 0,-3-16 0,6-1 0,4-14 0,0-7 0,0 2 0,0-7 0,0 4 0,0-45 0,0 10 0,0-41 0,0 17 0,0-12 0,0-10 0,0 12 0,0-15 0,4 23 0,-3-10 0,9 6 0,-9 6 0,4 8 0,-5 6 0,0 11 0,0 1 0,0 9 0,0-4 0,0 8 0,0-4 0,-4 5 0,0-1 0,-3 1 0,-4 3 0,3 0 0,-8 16 0,7-1 0,-10 32 0,4-10 0,-2 24 0,-3-3 0,4 0 0,-1-1 0,-3-2 0,9-10 0,-4 4 0,6-12 0,3-5 0,2-7 0,1-9 0,2-1 0,-2-3 0,-1-41 0,3 9 0,-3-29 0,4 15 0,0 5 0,0-6 0,0 5 0,0-4 0,0 15 0,4-8 0,-3 17 0,3-6 0,0 15 0,-4-6 0,7 38 0,-6-16 0,2 26 0,-3-21 0,0 0 0,0 5 0,0-4 0,0 9 0,0-9 0,0 9 0,0-9 0,0 9 0,0-8 0,0 7 0,0-7 0,0 7 0,0-3 0,0 5 0,0 5 0,0-4 0,-4 10 0,-2-5 0,-4 6 0,1 0 0,-6 6 0,3 2 0,-3-1 0,5 5 0,0-10 0,-1 10 0,6-11 0,-4 5 0,8-6 0,-4-5 0,5 3 0,0-9 0,0 16 0,0-9 0,5 10 0,4-6 0,6-6 0,9 6 0,1-9 0,5 5 0,5-8 0,-10-7 0,4-5 0,-13-10 0,0-1 0,0-8 0,6-10 0,3-12 0,1-15 0,-1-1 0,0-9 0,3-2 0,-7 10 0,5-14 0,-11 16 0,1-6 0,3 2 0,-8 6 0,3 5 0,-9 2 0,-1 10 0,-4 1 0,0 5 0,0 4 0,-3 4 0,-8 5 0,-2 3 0,-2 0 0,-6 13 0,5 14 0,-15 22 0,7 19 0,-10 10-546,3 6 546,0 1 0,4-26 0,9 12 0,0-28 0,6 5 0,-2-10 0,6-20 0,3 2 546,1-11-546,1-1 0,-8-5 0,-2-3 0,-11 0 0,2 0 0,-5 0 0,1 0 0,-7 0 0,5 0 0,-4 0 0,5 0 0,5 0 0,5 0 0,5 0 0,5 0 0,-8 0 0,6 0 0,-6 0 0,7 0 0,1 0 0,-4 0 0,3 0 0,-7 0 0,7 3 0,-4 1 0,5 4 0,-1-4 0,1 2 0,-4-5 0,3 2 0,-3-3 0,0 0 0,3 0 0,-3 0 0,-4 0 0,6 0 0,-6 0 0,4 0 0,2 0 0,-2 4 0,3-4 0,-2 4 0,1-4 0,-1 0 0,2 6 0,11 6 0,-2 0 0,6 2 0,0-10 0,-3 6 0,3-5 0,1 2 0,-1-1 0,1-1 0,2-1 0,-2-1 0,3-3 0,0 0 0,-3 0 0,2 3 0,-2 1 0,-1 0 0,0 6 0,1-8 0,-1 8 0,4-6 0,-6 3 0,8 0 0,-8-2 0,2 1 0,-27-18 0,14 8 0,-20-10 0,22 7 0,-4 7 0,-7-7 0,6 3 0,-6-4 0,4 4 0,2-2 0,-6 1 0,7 1 0,-4-3 0,5 6 0,-5-2 0,4-1 0,-4 0 0,5 0 0,-1 1 0,-2-1 0,5 0 0,-5-3 0,6-1 0,-1 1 0,2-4 0,0 3 0,18 27 0,-14-13 0,19 21 0,-16-20 0,0-3 0,6 6 0,-9-2 0,9 0 0,-6 2 0,4-9 0,-1 9 0,0-6 0,1 0 0,2 3 0,-5-3 0,2-37 0,1 10 0,3-35 0,9 13 0,1-2 0,-1 1 0,14-22 0,-4 10 0,6-13 0,-11 23 0,0-2 0,-4 9 0,5-12 0,-6 6 0,0 7 0,-6 8 0,-1 5 0,-4 0 0,0 5 0,0-3 0,-1 7 0,5-8 0,-4 4 0,4-5 0,-4 0 0,0 0 0,0-5 0,0 4 0,1-10 0,-1 10 0,0-4 0,0 5 0,0 0 0,-4-2 0,-1 6 0,-1-1 0,-2 12 0,3-4 0,-4 8 0,0-4 0,0-2 0,0 4 0,0-8 0,0 5 0,0-3 0,0-1 0,0 1 0,0 0 0,4-1 0,-4 1 0,4 3 0,-4-2 0,0 7 0,0-4 0,0 1 0,0 3 0,0-3 0,0-3 0,0 4 0,0-5 0,0 4 0,0 3 0,0-4 0,0 1 0,0 0 0</inkml:trace>
+  <inkml:trace contextRef="#ctx0" brushRef="#br0" timeOffset="9993">2058 483 24575,'0'26'0,"0"-5"0,0-13 0,0-1 0,0 4 0,0-3 0,0 3 0,0-1 0,0-2 0,0 3 0,0 0 0,0-3 0,0 2 0,0 1 0,0-3 0,0 3 0,0 0 0,0-3 0,0 2 0,0 1 0,0-3 0,0 3 0,0-1 0,0-1 0,0 1 0,0 1 0,0-3 0,0 3 0,0-1 0,0-2 0,0 3 0,0 0 0,0-3 0,0 2 0,0 1 0,0-3 0,0 3 0,0 0 0,0-3 0,-4 2 0,4 1 0,-4-3 0,4 3 0,-3-1 0,2-1 0,-2 1 0,3 1 0,-4-3 0,0 3 0,0-4 0,-2 4 0,5-3 0,-6 2 0,6-2 0,-2 2 0,0-1 0,2 1 0,-6 1 0,6-3 0,-2 3 0,0-4 0,-1 0 0,-4 4 0,4-3 0,-3 3 0,6-4 0,-5 1 0,2-1 0,-4 0 0,1 1 0</inkml:trace>
+  <inkml:trace contextRef="#ctx0" brushRef="#br0" timeOffset="11458">2086 823 24575,'0'-25'0,"0"4"0,0 16 0,0 2 0</inkml:trace>
+  <inkml:trace contextRef="#ctx0" brushRef="#br1" timeOffset="33918">1516 520 24575,'0'44'0,"0"-13"0,0-4 0,0-15 0,0-5 0,0 4 0,0-3 0,0 2 0,0 1 0,0-3 0,0 3 0,-7-3 0,5-1 0,-5 4 0,7-3 0,0 3 0,-4-1 0,0-1 0,0 1 0,-3-2 0,3 3 0,0-3 0,-3 4 0,6-5 0,-6 0 0,6 4 0,-5-37 0,5 21 0,-3-34 0,1 26 0,2 1 0,-3-3 0,4 6 0,0-6 0,0 6 0,-3-6 0,2 6 0,-3-2 0,4 3 0,-3 1 0,-1-4 0,-1 3 0,2-3 0,3 0 0,0 3 0,0-3 0,0 0 0,0 3 0,0-3 0,0 1 0,0 37 0,0-22 0,0 32 0,0-30 0,-7 1 0,5 3 0,-5-3 0,7 3 0,-4-4 0,3 4 0,-5-3 0,2 3 0,0-4 0,-6-3 0,5-17 0,-3 5 0,5-13 0,3 14 0,0 0 0,0-4 0,0 2 0,0-1 0,13 28 0,-10-12 0,14 21 0,-17-20 0,4 1 0,2 2 0,-4-1 0,8 1 0,-6-2 0,3-1 0,0 4 0,1-3 0,-1 2 0,-3-2 0,-1-1 0,4 0 0,-2 1 0,6-4 0,-1-1 0,-2-3 0,3 0 0,0 0 0,-3 0 0,2 0 0,1 0 0,-3 0 0,3 0 0,-1 0 0,-1 0 0,1 0 0,1 0 0,-33 13 0,22-6 0,-26 10 0,26-10 0,0 1 0,0 2 0,0-2 0,0 3 0,-4 0 0,0-3 0,0 2 0,1-2 0,3 2 0,-4-1 0,4 1 0,-7 1 0,6-3 0,-6 3 0,3-4 0,-3-3 0,-4 3 0,3-6 0,-3 2 0,0-3 0,3-4 0,-3-4 0,3 0 0,0-8 0,0 8 0,4-7 0,-3 2 0,6 1 0,-3 4 0,4 4 0</inkml:trace>
+  <inkml:trace contextRef="#ctx0" brushRef="#br1" timeOffset="38262">861 2295 24575,'-16'24'0,"2"-7"0,10-10 0,-3-6 0,-5 9 0,3-8 0,-6 4 0,11-2 0,-2 0 0,-2 3 0,0-3 0,-3 3 0,4-3 0,-1 3 0,1-3 0,-1 3 0,1-3 0,-1 7 0,4-3 0,-7 3 0,6 0 0,-7-2 0,4 6 0,-3-3 0,2 1 0,-3 2 0,1-6 0,2 2 0,1-3 0,1-1 0,6 1 0,-12-4 0,7 2 0,-5-2 0,5 4 0,2-1 0,-4 0 0,1 1 0,-1-1 0,1 0 0,3 1 0,-3-1 0,6 4 0,17-10 0,-11 2 0,18-11 0,-19 4 0,4-3 0,3 3 0,-3-4 0,8 0 0,-4 0 0,0 0 0,4 0 0,-8 4 0,3-3 0,-3 6 0,-1-2 0,4 3 0,-3 0 0,2 0 0,1 0 0,-3 0 0,3 3 0,-4 8 0,-3-2 0,-1 5 0,1-7 0,-3 0 0,5 4 0,-2-3 0,0 3 0,6-7 0,-2 2 0,4-1 0,-2-1 0,-2-1 0,-1 0 0,4 1 0,-3 4 0,3-1 0,-7 0 0,2 1 0,-2-1 0,4 0 0,-1 4 0,0-6 0,-3 5 0,6-6 0,-8 3 0,8 1 0,-3-4 0,-2 2 0,8-5 0,-8 6 0,6-3 0,-4 3 0,-3 0 0,2 4 0,-5-3 0,6 3 0,-6-4 0,8 1 0,0-4 0,-1 2 0,5-5 0,-8 2 0,5-6 0,-2-1 0</inkml:trace>
+  <inkml:trace contextRef="#ctx0" brushRef="#br1" timeOffset="40688">1067 2814 24575,'20'12'0,"-7"1"0,-6-12 0,-6 9 0,-15-32 0,7 23 0,-10-28 0,10 23 0,3-3 0,-4-1 0,4 1 0,-3-1 0,7-2 0,-4 1 0,1-2 0,-1 4 0,0 0 0,-3-1 0,3 1 0,-4-1 0</inkml:trace>
+  <inkml:trace contextRef="#ctx0" brushRef="#br1" timeOffset="44900">725 2455 24575,'-24'12'0,"3"-2"0,14-6 0,0 3 0,-1-3 0,1 3 0,-1 1 0,1-1 0,-1-3 0,1 3 0,-1-3 0,-3 3 0,3-3 0,-3 3 0,4-7 0,-1 7 0,1-3 0,0 3 0,-1-2 0,1 1 0,-1 1 0,1-2 0,-1 8 0,1-11 0,29 1 0,-16-4 0,21-5 0,-20 5 0,-3-2 0,6-4 0,-1 2 0,1-2 0,-2 0 0,-1 6 0,4-9 0,-3 8 0,2-7 0,-2 4 0,-4-2 0,6-4 0,-9 3 0,9 0 0,-6-2 0,0 5 0,3-5 0,-3-1 0,3 3 0,-3-3 0,3 3 0,-3 1 0,3-1 0,1 1 0,-24 26 0,11-17 0,-19 24 0,16-25 0,1 6 0,-4-7 0,3 7 0,-3-6 0,3 5 0,1-5 0,-4 6 0,6-3 0,-5 3 0,6 0 0,-3-3 0,-4 3 0,6-3 0,-5 3 0,6 1 0,0-1 0,-3 1 0,3 2 0,0-2 0,-3 0 0,3 2 0,0-6 0,-3 7 0,3-4 0,0 1 0,-3-1 0,6 4 0,-2 0 0</inkml:trace>
+  <inkml:trace contextRef="#ctx0" brushRef="#br1" timeOffset="47594">1365 466 24575,'0'24'0,"0"-3"0,0-14 0,-8-3 0,6 9 0,-5-7 0,4 8 0,2-7 0,-2 0 0,9-29 0,-1 18 0,2-19 0,0 47 0,-6-12 0,2 15 0,-3-20 0,0 1 0,0 2 0,0-1 0,0 1 0,0 1 0,0-3 0,0 3 0</inkml:trace>
+  <inkml:trace contextRef="#ctx0" brushRef="#br2" timeOffset="69907">708 557 24575,'-13'25'0,"1"2"0,4-9 0,-10 9 0,7-5 0,-11 6 0,12-1 0,-7-1 0,7 1 0,-3 0 0,0-5 0,8-1 0,-7 0 0,8-4 0,-9 9 0,3-4 0,-3 5 0,0-1 0,3-3 0,-2-3 0,4-3 0,3-1 0,-2-4 0,6 0 0,-2-5 0,-4-29 0,5 6 0,-5-31 0,7 1 0,0-2 0,0-12 0,4 13 0,2-4 0,4 5 0,5-1 0,-4-4 0,3 16 0,-4-9 0,-1 20 0,-1-2 0,1 9 0,-5 5 0,0 1 0,-27 18 0,10 4 0,-25 16 0,13 7 0,4-4 0,-8 10 0,13-6 0,-10 12 0,6-5 0,0 4 0,1-6 0,-1 0 0,1-6 0,4 5 0,-2-10 0,7 4 0,-3-10 0,5-1 0,-1-5 0,5-3 0,0-2 0,1-4 0,2 1 0,-2 3 0,3-3 0,0 8 0,0-4 0,0 0 0,0 3 0,0-6 0,0 6 0,0-7 0,0 4 0,3-5 0,9-30 0,-2 8 0,6-33 0,-6 14 0,0-5 0,-1 6 0,0-5 0,-3 15 0,1-4 0,-6 15 0,0 4 0,-20 45 0,-3-4 0,-9 37 0,0-17 0,14-6 0,-8 4 0,9-5 0,-5 7 0,1-7 0,4-1 0,2-11 0,9-2 0,-3-5 0,7-5 0,-3-1 0,4-9 0,0 3 0,0-6 0,0 2 0,0 0 0,0-3 0,0 2 0,14-40 0,-6 13 0,12-33 0,-11 23 0,0 1 0,0-1 0,-4 5 0,2 4 0,-6 3 0,2 7 0,-3 35 0,0-9 0,0 28 0,0-21 0,0-7 0,0 2 0,0-3 0,0-1 0,0 0 0,0 1 0,0-5 0,0 3 0,3-6 0,2 6 0,2-7 0,1 3 0,-1 1 0,1-4 0,0 3 0,-1-3 0,0-4 0,4-1 0,-3-3 0,3 0 0,0-12 0,-2 2 0,2-11 0,-2 5 0,-1-1 0,-4 1 0,0 3 0,-4 2 0,0 3 0,-8 35 0,2-10 0,-7 34 0,4-23 0,4 4 0,-3-5 0,7-5 0,-7-1 0,7-9 0,-3 4 0,4-8 0,0 3 0,0 0 0,-3-3 0,2 3 0,-5-1 0,-5-25 0,2 20 0,-2-21 0,4 35 0,6-5 0,-6 6 0,6-5 0,-2-7 0,3 3 0,-3-3 0,2 2 0,-3-1 0,4 1 0,0 1 0,0-3 0,-3 3 0,2-1 0,-2-2 0,3 3 0,0 0 0,0-3 0,0 3 0,0-1 0,0-2 0,0 3 0,0 0 0,3-3 0,-2 2 0,6 1 0,-7-3 0,4 3 0,-1-1 0,-2-1 0,2 1 0,7-6 0,-4 0 0,7-4 0,-2 0 0,-3 0 0,3 0 0,0 0 0,-3 0 0,2 0 0,1 0 0,-3 0 0,3 0 0,-1 0 0,-1 0 0,1 0 0,1 0 0,-3-4 0,3 0 0,-4-3 0,-3-1 0,3 1 0,-3-1 0,3 1 0,-3-1 0,3-2 0,-3 1 0,3-2 0</inkml:trace>
+  <inkml:trace contextRef="#ctx0" brushRef="#br2" timeOffset="71034">136 2330 24575,'0'0'0</inkml:trace>
+  <inkml:trace contextRef="#ctx0" brushRef="#br2" timeOffset="73148">830 515 24575,'0'24'0,"0"-4"0,4-16 0,-4 3 0,10 0 0,-8 1 0,8 0 0,-3-2 0,1-5 0,3 2 0,-4-3 0</inkml:trace>
+  <inkml:trace contextRef="#ctx0" brushRef="#br1" timeOffset="83174">466 2666 24575,'17'-16'0,"-1"5"0,-15 5 0,5 5 0,-1-12 0,-1 7 0,-1-8 0,0 6 0,1 1 0,4-1 0,-1 1 0,1-5 0,-1 7 0,1-5 0,-1 9 0,1-6 0,-1 3 0,4-3 0,-3 2 0,2-1 0,-2 5 0,-1-6 0,-3-4 0,3 2 0,-6-6 0,5 7 0,-5 1 0,5-4 0,-5 3 0,3-3 0,-4 0 0,3 3 0,-2-3 0,8 4 0,-4 2 0,6-1 0,-3-6 0,-1 3 0,1-6 0,-1 11 0,1-2 0,-1 1 0,4-2 0,-7 3 0,3 0 0</inkml:trace>
+  <inkml:trace contextRef="#ctx0" brushRef="#br1" timeOffset="86303">336 2753 24575,'16'-20'0,"-2"2"0,-7 11 0,1-1 0,-4 1 0,2-1 0,-2 1 0,4-1 0,-1 1 0,0 0 0,-3-1 0,6 4 0,-5-3 0,6 6 0,-4-5 0,1 2 0,2 0 0,-5-3 0,8 6 0,-8-2 0,6-1 0,-1 4 0,-2-7 0,3 3 0,-4 0 0,1-3 0,-4 0 0,-1-2 0,-23 12 0,12-1 0,-16 12 0,16-7 0,1-3 0,-1 3 0,-2-6 0,1 5 0,2-2 0,4 7 0,3-3 0,0 3 0,0-1 0,0-2 0,0 3 0,0-4 0</inkml:trace>
+</inkml:ink>
+</file>
+
 <file path=ppt/slideLayouts/slideLayout1.xml><?xml version="1.0" encoding="utf-8"?>
 <p:sldLayout xmlns:a="http://schemas.openxmlformats.org/drawingml/2006/main" xmlns:r="http://schemas.openxmlformats.org/officeDocument/2006/relationships" xmlns:p="http://schemas.openxmlformats.org/presentationml/2006/main" type="title" preserve="1">
   <p:cSld name="Diapositive de titre">
@@ -259,7 +311,7 @@
           <a:p>
             <a:fld id="{4B434F99-15DD-404C-8155-49308CA68B25}" type="datetimeFigureOut">
               <a:rPr lang="fr-FR" smtClean="0"/>
-              <a:t>12/10/2018</a:t>
+              <a:t>21/11/2018</a:t>
             </a:fld>
             <a:endParaRPr lang="fr-FR"/>
           </a:p>
@@ -432,7 +484,7 @@
           <a:p>
             <a:fld id="{4B434F99-15DD-404C-8155-49308CA68B25}" type="datetimeFigureOut">
               <a:rPr lang="fr-FR" smtClean="0"/>
-              <a:t>12/10/2018</a:t>
+              <a:t>21/11/2018</a:t>
             </a:fld>
             <a:endParaRPr lang="fr-FR"/>
           </a:p>
@@ -615,7 +667,7 @@
           <a:p>
             <a:fld id="{4B434F99-15DD-404C-8155-49308CA68B25}" type="datetimeFigureOut">
               <a:rPr lang="fr-FR" smtClean="0"/>
-              <a:t>12/10/2018</a:t>
+              <a:t>21/11/2018</a:t>
             </a:fld>
             <a:endParaRPr lang="fr-FR"/>
           </a:p>
@@ -788,7 +840,7 @@
           <a:p>
             <a:fld id="{4B434F99-15DD-404C-8155-49308CA68B25}" type="datetimeFigureOut">
               <a:rPr lang="fr-FR" smtClean="0"/>
-              <a:t>12/10/2018</a:t>
+              <a:t>21/11/2018</a:t>
             </a:fld>
             <a:endParaRPr lang="fr-FR"/>
           </a:p>
@@ -1066,7 +1118,7 @@
           <a:p>
             <a:fld id="{4B434F99-15DD-404C-8155-49308CA68B25}" type="datetimeFigureOut">
               <a:rPr lang="fr-FR" smtClean="0"/>
-              <a:t>12/10/2018</a:t>
+              <a:t>21/11/2018</a:t>
             </a:fld>
             <a:endParaRPr lang="fr-FR"/>
           </a:p>
@@ -1281,7 +1333,7 @@
           <a:p>
             <a:fld id="{4B434F99-15DD-404C-8155-49308CA68B25}" type="datetimeFigureOut">
               <a:rPr lang="fr-FR" smtClean="0"/>
-              <a:t>12/10/2018</a:t>
+              <a:t>21/11/2018</a:t>
             </a:fld>
             <a:endParaRPr lang="fr-FR"/>
           </a:p>
@@ -1649,7 +1701,7 @@
           <a:p>
             <a:fld id="{4B434F99-15DD-404C-8155-49308CA68B25}" type="datetimeFigureOut">
               <a:rPr lang="fr-FR" smtClean="0"/>
-              <a:t>12/10/2018</a:t>
+              <a:t>21/11/2018</a:t>
             </a:fld>
             <a:endParaRPr lang="fr-FR"/>
           </a:p>
@@ -1790,7 +1842,7 @@
           <a:p>
             <a:fld id="{4B434F99-15DD-404C-8155-49308CA68B25}" type="datetimeFigureOut">
               <a:rPr lang="fr-FR" smtClean="0"/>
-              <a:t>12/10/2018</a:t>
+              <a:t>21/11/2018</a:t>
             </a:fld>
             <a:endParaRPr lang="fr-FR"/>
           </a:p>
@@ -1903,7 +1955,7 @@
           <a:p>
             <a:fld id="{4B434F99-15DD-404C-8155-49308CA68B25}" type="datetimeFigureOut">
               <a:rPr lang="fr-FR" smtClean="0"/>
-              <a:t>12/10/2018</a:t>
+              <a:t>21/11/2018</a:t>
             </a:fld>
             <a:endParaRPr lang="fr-FR"/>
           </a:p>
@@ -2192,7 +2244,7 @@
           <a:p>
             <a:fld id="{4B434F99-15DD-404C-8155-49308CA68B25}" type="datetimeFigureOut">
               <a:rPr lang="fr-FR" smtClean="0"/>
-              <a:t>12/10/2018</a:t>
+              <a:t>21/11/2018</a:t>
             </a:fld>
             <a:endParaRPr lang="fr-FR"/>
           </a:p>
@@ -2483,7 +2535,7 @@
           <a:p>
             <a:fld id="{4B434F99-15DD-404C-8155-49308CA68B25}" type="datetimeFigureOut">
               <a:rPr lang="fr-FR" smtClean="0"/>
-              <a:t>12/10/2018</a:t>
+              <a:t>21/11/2018</a:t>
             </a:fld>
             <a:endParaRPr lang="fr-FR"/>
           </a:p>
@@ -2699,7 +2751,7 @@
           <a:p>
             <a:fld id="{4B434F99-15DD-404C-8155-49308CA68B25}" type="datetimeFigureOut">
               <a:rPr lang="fr-FR" smtClean="0"/>
-              <a:t>12/10/2018</a:t>
+              <a:t>21/11/2018</a:t>
             </a:fld>
             <a:endParaRPr lang="fr-FR"/>
           </a:p>
@@ -3557,6 +3609,115 @@
 </p:sld>
 </file>
 
+<file path=ppt/slides/slide2.xml><?xml version="1.0" encoding="utf-8"?>
+<p:sld xmlns:a="http://schemas.openxmlformats.org/drawingml/2006/main" xmlns:r="http://schemas.openxmlformats.org/officeDocument/2006/relationships" xmlns:p="http://schemas.openxmlformats.org/presentationml/2006/main">
+  <p:cSld>
+    <p:spTree>
+      <p:nvGrpSpPr>
+        <p:cNvPr id="1" name=""/>
+        <p:cNvGrpSpPr/>
+        <p:nvPr/>
+      </p:nvGrpSpPr>
+      <p:grpSpPr>
+        <a:xfrm>
+          <a:off x="0" y="0"/>
+          <a:ext cx="0" cy="0"/>
+          <a:chOff x="0" y="0"/>
+          <a:chExt cx="0" cy="0"/>
+        </a:xfrm>
+      </p:grpSpPr>
+      <p:pic>
+        <p:nvPicPr>
+          <p:cNvPr id="5" name="Espace réservé du contenu 4">
+            <a:extLst>
+              <a:ext uri="{FF2B5EF4-FFF2-40B4-BE49-F238E27FC236}">
+                <a16:creationId xmlns:a16="http://schemas.microsoft.com/office/drawing/2014/main" id="{CE0584AB-D0EB-EA49-9982-8CC063E24E82}"/>
+              </a:ext>
+            </a:extLst>
+          </p:cNvPr>
+          <p:cNvPicPr>
+            <a:picLocks noGrp="1" noChangeAspect="1"/>
+          </p:cNvPicPr>
+          <p:nvPr>
+            <p:ph idx="1"/>
+          </p:nvPr>
+        </p:nvPicPr>
+        <p:blipFill rotWithShape="1">
+          <a:blip r:embed="rId2"/>
+          <a:srcRect r="75375"/>
+          <a:stretch/>
+        </p:blipFill>
+        <p:spPr>
+          <a:xfrm>
+            <a:off x="2349062" y="1794032"/>
+            <a:ext cx="3332410" cy="3269936"/>
+          </a:xfrm>
+        </p:spPr>
+      </p:pic>
+      <mc:AlternateContent xmlns:mc="http://schemas.openxmlformats.org/markup-compatibility/2006">
+        <mc:Choice xmlns:p14="http://schemas.microsoft.com/office/powerpoint/2010/main" Requires="p14">
+          <p:contentPart p14:bwMode="auto" r:id="rId3">
+            <p14:nvContentPartPr>
+              <p14:cNvPr id="32" name="Encre 31">
+                <a:extLst>
+                  <a:ext uri="{FF2B5EF4-FFF2-40B4-BE49-F238E27FC236}">
+                    <a16:creationId xmlns:a16="http://schemas.microsoft.com/office/drawing/2014/main" id="{EE05D7C0-49AB-0845-844F-1FE0BFB7312C}"/>
+                  </a:ext>
+                </a:extLst>
+              </p14:cNvPr>
+              <p14:cNvContentPartPr/>
+              <p14:nvPr/>
+            </p14:nvContentPartPr>
+            <p14:xfrm>
+              <a:off x="4338825" y="2982665"/>
+              <a:ext cx="1411560" cy="1181160"/>
+            </p14:xfrm>
+          </p:contentPart>
+        </mc:Choice>
+        <mc:Fallback>
+          <p:pic>
+            <p:nvPicPr>
+              <p:cNvPr id="32" name="Encre 31">
+                <a:extLst>
+                  <a:ext uri="{FF2B5EF4-FFF2-40B4-BE49-F238E27FC236}">
+                    <a16:creationId xmlns:a16="http://schemas.microsoft.com/office/drawing/2014/main" id="{EE05D7C0-49AB-0845-844F-1FE0BFB7312C}"/>
+                  </a:ext>
+                </a:extLst>
+              </p:cNvPr>
+              <p:cNvPicPr/>
+              <p:nvPr/>
+            </p:nvPicPr>
+            <p:blipFill>
+              <a:blip r:embed="rId4"/>
+              <a:stretch>
+                <a:fillRect/>
+              </a:stretch>
+            </p:blipFill>
+            <p:spPr>
+              <a:xfrm>
+                <a:off x="4276185" y="2920025"/>
+                <a:ext cx="1537200" cy="1306800"/>
+              </a:xfrm>
+              <a:prstGeom prst="rect">
+                <a:avLst/>
+              </a:prstGeom>
+            </p:spPr>
+          </p:pic>
+        </mc:Fallback>
+      </mc:AlternateContent>
+    </p:spTree>
+    <p:extLst>
+      <p:ext uri="{BB962C8B-B14F-4D97-AF65-F5344CB8AC3E}">
+        <p14:creationId xmlns:p14="http://schemas.microsoft.com/office/powerpoint/2010/main" val="905016301"/>
+      </p:ext>
+    </p:extLst>
+  </p:cSld>
+  <p:clrMapOvr>
+    <a:masterClrMapping/>
+  </p:clrMapOvr>
+</p:sld>
+</file>
+
 <file path=ppt/theme/theme1.xml><?xml version="1.0" encoding="utf-8"?>
 <a:theme xmlns:a="http://schemas.openxmlformats.org/drawingml/2006/main" name="Thème Office">
   <a:themeElements>

</xml_diff>